<commit_message>
Scrum Board updated and review implementation, sequence and class diagram, and unit tests
</commit_message>
<xml_diff>
--- a/SE202526/Management/Sprint7/Scrum_Board_Sprint_7.pptx
+++ b/SE202526/Management/Sprint7/Scrum_Board_Sprint_7.pptx
@@ -5,7 +5,7 @@
     <p:sldMasterId id="2147483659" r:id="rId1"/>
   </p:sldMasterIdLst>
   <p:notesMasterIdLst>
-    <p:notesMasterId r:id="rId8"/>
+    <p:notesMasterId r:id="rId9"/>
   </p:notesMasterIdLst>
   <p:sldIdLst>
     <p:sldId id="256" r:id="rId2"/>
@@ -14,6 +14,7 @@
     <p:sldId id="286" r:id="rId5"/>
     <p:sldId id="293" r:id="rId6"/>
     <p:sldId id="294" r:id="rId7"/>
+    <p:sldId id="295" r:id="rId8"/>
   </p:sldIdLst>
   <p:sldSz cx="21599525" cy="10799763"/>
   <p:notesSz cx="6858000" cy="9144000"/>
@@ -1464,6 +1465,140 @@
 </p:notes>
 </file>
 
+<file path=ppt/notesSlides/notesSlide7.xml><?xml version="1.0" encoding="utf-8"?>
+<p:notes xmlns:a="http://schemas.openxmlformats.org/drawingml/2006/main" xmlns:r="http://schemas.openxmlformats.org/officeDocument/2006/relationships" xmlns:p="http://schemas.openxmlformats.org/presentationml/2006/main" showMasterSp="0" showMasterPhAnim="0">
+  <p:cSld>
+    <p:spTree>
+      <p:nvGrpSpPr>
+        <p:cNvPr id="1" name="Shape 62">
+          <a:extLst>
+            <a:ext uri="{FF2B5EF4-FFF2-40B4-BE49-F238E27FC236}">
+              <a16:creationId xmlns:a16="http://schemas.microsoft.com/office/drawing/2014/main" id="{3F614F39-69C4-BD4D-D1C9-93BC555917C2}"/>
+            </a:ext>
+          </a:extLst>
+        </p:cNvPr>
+        <p:cNvGrpSpPr/>
+        <p:nvPr/>
+      </p:nvGrpSpPr>
+      <p:grpSpPr>
+        <a:xfrm>
+          <a:off x="0" y="0"/>
+          <a:ext cx="0" cy="0"/>
+          <a:chOff x="0" y="0"/>
+          <a:chExt cx="0" cy="0"/>
+        </a:xfrm>
+      </p:grpSpPr>
+      <p:sp>
+        <p:nvSpPr>
+          <p:cNvPr id="63" name="Google Shape;63;g3850b307b58_0_0:notes">
+            <a:extLst>
+              <a:ext uri="{FF2B5EF4-FFF2-40B4-BE49-F238E27FC236}">
+                <a16:creationId xmlns:a16="http://schemas.microsoft.com/office/drawing/2014/main" id="{8D33CAA3-6395-16CC-5372-F45BDDB7F0EF}"/>
+              </a:ext>
+            </a:extLst>
+          </p:cNvPr>
+          <p:cNvSpPr>
+            <a:spLocks noGrp="1" noRot="1" noChangeAspect="1"/>
+          </p:cNvSpPr>
+          <p:nvPr>
+            <p:ph type="sldImg" idx="2"/>
+          </p:nvPr>
+        </p:nvSpPr>
+        <p:spPr>
+          <a:xfrm>
+            <a:off x="0" y="685800"/>
+            <a:ext cx="6858000" cy="3429000"/>
+          </a:xfrm>
+          <a:custGeom>
+            <a:avLst/>
+            <a:gdLst/>
+            <a:ahLst/>
+            <a:cxnLst/>
+            <a:rect l="l" t="t" r="r" b="b"/>
+            <a:pathLst>
+              <a:path w="120000" h="120000" extrusionOk="0">
+                <a:moveTo>
+                  <a:pt x="0" y="0"/>
+                </a:moveTo>
+                <a:lnTo>
+                  <a:pt x="120000" y="0"/>
+                </a:lnTo>
+                <a:lnTo>
+                  <a:pt x="120000" y="120000"/>
+                </a:lnTo>
+                <a:lnTo>
+                  <a:pt x="0" y="120000"/>
+                </a:lnTo>
+                <a:close/>
+              </a:path>
+            </a:pathLst>
+          </a:custGeom>
+        </p:spPr>
+        <p:txBody>
+          <a:bodyPr/>
+          <a:lstStyle/>
+          <a:p>
+            <a:endParaRPr lang="pt-PT"/>
+          </a:p>
+        </p:txBody>
+      </p:sp>
+      <p:sp>
+        <p:nvSpPr>
+          <p:cNvPr id="64" name="Google Shape;64;g3850b307b58_0_0:notes">
+            <a:extLst>
+              <a:ext uri="{FF2B5EF4-FFF2-40B4-BE49-F238E27FC236}">
+                <a16:creationId xmlns:a16="http://schemas.microsoft.com/office/drawing/2014/main" id="{24BE5413-6AD0-0141-EC54-7D0DB457617E}"/>
+              </a:ext>
+            </a:extLst>
+          </p:cNvPr>
+          <p:cNvSpPr txBox="1">
+            <a:spLocks noGrp="1"/>
+          </p:cNvSpPr>
+          <p:nvPr>
+            <p:ph type="body" idx="1"/>
+          </p:nvPr>
+        </p:nvSpPr>
+        <p:spPr>
+          <a:xfrm>
+            <a:off x="685800" y="4343400"/>
+            <a:ext cx="5486400" cy="4114800"/>
+          </a:xfrm>
+          <a:prstGeom prst="rect">
+            <a:avLst/>
+          </a:prstGeom>
+        </p:spPr>
+        <p:txBody>
+          <a:bodyPr spcFirstLastPara="1" wrap="square" lIns="91425" tIns="91425" rIns="91425" bIns="91425" anchor="t" anchorCtr="0">
+            <a:noAutofit/>
+          </a:bodyPr>
+          <a:lstStyle/>
+          <a:p>
+            <a:pPr marL="0" lvl="0" indent="0" algn="l" rtl="0">
+              <a:spcBef>
+                <a:spcPts val="0"/>
+              </a:spcBef>
+              <a:spcAft>
+                <a:spcPts val="0"/>
+              </a:spcAft>
+              <a:buNone/>
+            </a:pPr>
+            <a:endParaRPr/>
+          </a:p>
+        </p:txBody>
+      </p:sp>
+    </p:spTree>
+    <p:extLst>
+      <p:ext uri="{BB962C8B-B14F-4D97-AF65-F5344CB8AC3E}">
+        <p14:creationId xmlns:p14="http://schemas.microsoft.com/office/powerpoint/2010/main" val="849739428"/>
+      </p:ext>
+    </p:extLst>
+  </p:cSld>
+  <p:clrMapOvr>
+    <a:masterClrMapping/>
+  </p:clrMapOvr>
+</p:notes>
+</file>
+
 <file path=ppt/slideLayouts/slideLayout1.xml><?xml version="1.0" encoding="utf-8"?>
 <p:sldLayout xmlns:a="http://schemas.openxmlformats.org/drawingml/2006/main" xmlns:r="http://schemas.openxmlformats.org/officeDocument/2006/relationships" xmlns:p="http://schemas.openxmlformats.org/presentationml/2006/main" matchingName="Title slide" type="title">
   <p:cSld name="TITLE">
@@ -13724,6 +13859,1833 @@
     <p:extLst>
       <p:ext uri="{BB962C8B-B14F-4D97-AF65-F5344CB8AC3E}">
         <p14:creationId xmlns:p14="http://schemas.microsoft.com/office/powerpoint/2010/main" val="2688754398"/>
+      </p:ext>
+    </p:extLst>
+  </p:cSld>
+  <p:clrMapOvr>
+    <a:masterClrMapping/>
+  </p:clrMapOvr>
+</p:sld>
+</file>
+
+<file path=ppt/slides/slide7.xml><?xml version="1.0" encoding="utf-8"?>
+<p:sld xmlns:a="http://schemas.openxmlformats.org/drawingml/2006/main" xmlns:r="http://schemas.openxmlformats.org/officeDocument/2006/relationships" xmlns:p="http://schemas.openxmlformats.org/presentationml/2006/main">
+  <p:cSld>
+    <p:spTree>
+      <p:nvGrpSpPr>
+        <p:cNvPr id="1" name="Shape 65">
+          <a:extLst>
+            <a:ext uri="{FF2B5EF4-FFF2-40B4-BE49-F238E27FC236}">
+              <a16:creationId xmlns:a16="http://schemas.microsoft.com/office/drawing/2014/main" id="{6158AD5C-37BC-CDAA-447B-2C46EA192B7D}"/>
+            </a:ext>
+          </a:extLst>
+        </p:cNvPr>
+        <p:cNvGrpSpPr/>
+        <p:nvPr/>
+      </p:nvGrpSpPr>
+      <p:grpSpPr>
+        <a:xfrm>
+          <a:off x="0" y="0"/>
+          <a:ext cx="0" cy="0"/>
+          <a:chOff x="0" y="0"/>
+          <a:chExt cx="0" cy="0"/>
+        </a:xfrm>
+      </p:grpSpPr>
+      <p:cxnSp>
+        <p:nvCxnSpPr>
+          <p:cNvPr id="66" name="Google Shape;66;p15">
+            <a:extLst>
+              <a:ext uri="{FF2B5EF4-FFF2-40B4-BE49-F238E27FC236}">
+                <a16:creationId xmlns:a16="http://schemas.microsoft.com/office/drawing/2014/main" id="{DA795071-BD07-B1C5-7B37-ED5325D2E7AE}"/>
+              </a:ext>
+            </a:extLst>
+          </p:cNvPr>
+          <p:cNvCxnSpPr/>
+          <p:nvPr/>
+        </p:nvCxnSpPr>
+        <p:spPr>
+          <a:xfrm>
+            <a:off x="5944724" y="-31500"/>
+            <a:ext cx="0" cy="10857000"/>
+          </a:xfrm>
+          <a:prstGeom prst="straightConnector1">
+            <a:avLst/>
+          </a:prstGeom>
+          <a:noFill/>
+          <a:ln w="38100" cap="flat" cmpd="sng">
+            <a:solidFill>
+              <a:srgbClr val="5B0F00"/>
+            </a:solidFill>
+            <a:prstDash val="solid"/>
+            <a:round/>
+            <a:headEnd type="none" w="med" len="med"/>
+            <a:tailEnd type="none" w="med" len="med"/>
+          </a:ln>
+        </p:spPr>
+      </p:cxnSp>
+      <p:sp>
+        <p:nvSpPr>
+          <p:cNvPr id="67" name="Google Shape;67;p15">
+            <a:extLst>
+              <a:ext uri="{FF2B5EF4-FFF2-40B4-BE49-F238E27FC236}">
+                <a16:creationId xmlns:a16="http://schemas.microsoft.com/office/drawing/2014/main" id="{0148EEC9-C0E0-C0EF-8D1D-7617473A53D6}"/>
+              </a:ext>
+            </a:extLst>
+          </p:cNvPr>
+          <p:cNvSpPr/>
+          <p:nvPr/>
+        </p:nvSpPr>
+        <p:spPr>
+          <a:xfrm>
+            <a:off x="3197186" y="84312"/>
+            <a:ext cx="2410800" cy="480900"/>
+          </a:xfrm>
+          <a:prstGeom prst="roundRect">
+            <a:avLst>
+              <a:gd name="adj" fmla="val 16667"/>
+            </a:avLst>
+          </a:prstGeom>
+          <a:solidFill>
+            <a:srgbClr val="F9CB9C"/>
+          </a:solidFill>
+          <a:ln w="28575" cap="flat" cmpd="sng">
+            <a:solidFill>
+              <a:srgbClr val="B45F06"/>
+            </a:solidFill>
+            <a:prstDash val="solid"/>
+            <a:round/>
+            <a:headEnd type="none" w="sm" len="sm"/>
+            <a:tailEnd type="none" w="sm" len="sm"/>
+          </a:ln>
+        </p:spPr>
+        <p:txBody>
+          <a:bodyPr spcFirstLastPara="1" wrap="square" lIns="91425" tIns="91425" rIns="91425" bIns="91425" anchor="ctr" anchorCtr="0">
+            <a:noAutofit/>
+          </a:bodyPr>
+          <a:lstStyle/>
+          <a:p>
+            <a:pPr marL="0" lvl="0" indent="0" algn="ctr" rtl="0">
+              <a:spcBef>
+                <a:spcPts val="0"/>
+              </a:spcBef>
+              <a:spcAft>
+                <a:spcPts val="0"/>
+              </a:spcAft>
+              <a:buNone/>
+            </a:pPr>
+            <a:r>
+              <a:rPr lang="en-US" sz="1800" b="1" noProof="0" dirty="0">
+                <a:latin typeface="Consolas"/>
+                <a:ea typeface="Consolas"/>
+                <a:cs typeface="Consolas"/>
+                <a:sym typeface="Consolas"/>
+              </a:rPr>
+              <a:t>Student ID</a:t>
+            </a:r>
+          </a:p>
+        </p:txBody>
+      </p:sp>
+      <p:sp>
+        <p:nvSpPr>
+          <p:cNvPr id="68" name="Google Shape;68;p15">
+            <a:extLst>
+              <a:ext uri="{FF2B5EF4-FFF2-40B4-BE49-F238E27FC236}">
+                <a16:creationId xmlns:a16="http://schemas.microsoft.com/office/drawing/2014/main" id="{07743F76-ABA1-0786-68B7-F064D008989A}"/>
+              </a:ext>
+            </a:extLst>
+          </p:cNvPr>
+          <p:cNvSpPr/>
+          <p:nvPr/>
+        </p:nvSpPr>
+        <p:spPr>
+          <a:xfrm>
+            <a:off x="6281636" y="84312"/>
+            <a:ext cx="2410800" cy="480900"/>
+          </a:xfrm>
+          <a:prstGeom prst="roundRect">
+            <a:avLst>
+              <a:gd name="adj" fmla="val 16667"/>
+            </a:avLst>
+          </a:prstGeom>
+          <a:solidFill>
+            <a:srgbClr val="F9CB9C"/>
+          </a:solidFill>
+          <a:ln w="28575" cap="flat" cmpd="sng">
+            <a:solidFill>
+              <a:srgbClr val="B45F06"/>
+            </a:solidFill>
+            <a:prstDash val="solid"/>
+            <a:round/>
+            <a:headEnd type="none" w="sm" len="sm"/>
+            <a:tailEnd type="none" w="sm" len="sm"/>
+          </a:ln>
+        </p:spPr>
+        <p:txBody>
+          <a:bodyPr spcFirstLastPara="1" wrap="square" lIns="91425" tIns="91425" rIns="91425" bIns="91425" anchor="ctr" anchorCtr="0">
+            <a:noAutofit/>
+          </a:bodyPr>
+          <a:lstStyle/>
+          <a:p>
+            <a:pPr marL="0" lvl="0" indent="0" algn="ctr" rtl="0">
+              <a:spcBef>
+                <a:spcPts val="0"/>
+              </a:spcBef>
+              <a:spcAft>
+                <a:spcPts val="0"/>
+              </a:spcAft>
+              <a:buNone/>
+            </a:pPr>
+            <a:r>
+              <a:rPr lang="en-US" sz="1800" b="1" noProof="0" dirty="0">
+                <a:latin typeface="Consolas"/>
+                <a:ea typeface="Consolas"/>
+                <a:cs typeface="Consolas"/>
+                <a:sym typeface="Consolas"/>
+              </a:rPr>
+              <a:t>Story</a:t>
+            </a:r>
+          </a:p>
+        </p:txBody>
+      </p:sp>
+      <p:sp>
+        <p:nvSpPr>
+          <p:cNvPr id="69" name="Google Shape;69;p15">
+            <a:extLst>
+              <a:ext uri="{FF2B5EF4-FFF2-40B4-BE49-F238E27FC236}">
+                <a16:creationId xmlns:a16="http://schemas.microsoft.com/office/drawing/2014/main" id="{6F115AD0-D04E-9621-9A5D-472B64EDC856}"/>
+              </a:ext>
+            </a:extLst>
+          </p:cNvPr>
+          <p:cNvSpPr/>
+          <p:nvPr/>
+        </p:nvSpPr>
+        <p:spPr>
+          <a:xfrm>
+            <a:off x="9366071" y="84312"/>
+            <a:ext cx="2410800" cy="480900"/>
+          </a:xfrm>
+          <a:prstGeom prst="roundRect">
+            <a:avLst>
+              <a:gd name="adj" fmla="val 16667"/>
+            </a:avLst>
+          </a:prstGeom>
+          <a:solidFill>
+            <a:srgbClr val="F9CB9C"/>
+          </a:solidFill>
+          <a:ln w="28575" cap="flat" cmpd="sng">
+            <a:solidFill>
+              <a:srgbClr val="B45F06"/>
+            </a:solidFill>
+            <a:prstDash val="solid"/>
+            <a:round/>
+            <a:headEnd type="none" w="sm" len="sm"/>
+            <a:tailEnd type="none" w="sm" len="sm"/>
+          </a:ln>
+        </p:spPr>
+        <p:txBody>
+          <a:bodyPr spcFirstLastPara="1" wrap="square" lIns="91425" tIns="91425" rIns="91425" bIns="91425" anchor="ctr" anchorCtr="0">
+            <a:noAutofit/>
+          </a:bodyPr>
+          <a:lstStyle/>
+          <a:p>
+            <a:pPr marL="0" lvl="0" indent="0" algn="ctr" rtl="0">
+              <a:spcBef>
+                <a:spcPts val="0"/>
+              </a:spcBef>
+              <a:spcAft>
+                <a:spcPts val="0"/>
+              </a:spcAft>
+              <a:buNone/>
+            </a:pPr>
+            <a:r>
+              <a:rPr lang="en-US" sz="1800" b="1" noProof="0" dirty="0">
+                <a:latin typeface="Consolas"/>
+                <a:ea typeface="Consolas"/>
+                <a:cs typeface="Consolas"/>
+                <a:sym typeface="Consolas"/>
+              </a:rPr>
+              <a:t>To Do</a:t>
+            </a:r>
+          </a:p>
+        </p:txBody>
+      </p:sp>
+      <p:sp>
+        <p:nvSpPr>
+          <p:cNvPr id="70" name="Google Shape;70;p15">
+            <a:extLst>
+              <a:ext uri="{FF2B5EF4-FFF2-40B4-BE49-F238E27FC236}">
+                <a16:creationId xmlns:a16="http://schemas.microsoft.com/office/drawing/2014/main" id="{67547BEB-5812-8D1E-D620-B83BDD857B99}"/>
+              </a:ext>
+            </a:extLst>
+          </p:cNvPr>
+          <p:cNvSpPr/>
+          <p:nvPr/>
+        </p:nvSpPr>
+        <p:spPr>
+          <a:xfrm>
+            <a:off x="12395940" y="84312"/>
+            <a:ext cx="2410800" cy="480900"/>
+          </a:xfrm>
+          <a:prstGeom prst="roundRect">
+            <a:avLst>
+              <a:gd name="adj" fmla="val 16667"/>
+            </a:avLst>
+          </a:prstGeom>
+          <a:solidFill>
+            <a:srgbClr val="F9CB9C"/>
+          </a:solidFill>
+          <a:ln w="28575" cap="flat" cmpd="sng">
+            <a:solidFill>
+              <a:srgbClr val="B45F06"/>
+            </a:solidFill>
+            <a:prstDash val="solid"/>
+            <a:round/>
+            <a:headEnd type="none" w="sm" len="sm"/>
+            <a:tailEnd type="none" w="sm" len="sm"/>
+          </a:ln>
+        </p:spPr>
+        <p:txBody>
+          <a:bodyPr spcFirstLastPara="1" wrap="square" lIns="91425" tIns="91425" rIns="91425" bIns="91425" anchor="ctr" anchorCtr="0">
+            <a:noAutofit/>
+          </a:bodyPr>
+          <a:lstStyle/>
+          <a:p>
+            <a:pPr marL="0" lvl="0" indent="0" algn="ctr" rtl="0">
+              <a:spcBef>
+                <a:spcPts val="0"/>
+              </a:spcBef>
+              <a:spcAft>
+                <a:spcPts val="0"/>
+              </a:spcAft>
+              <a:buNone/>
+            </a:pPr>
+            <a:r>
+              <a:rPr lang="en-US" sz="1800" b="1" noProof="0" dirty="0">
+                <a:latin typeface="Consolas"/>
+                <a:ea typeface="Consolas"/>
+                <a:cs typeface="Consolas"/>
+                <a:sym typeface="Consolas"/>
+              </a:rPr>
+              <a:t>Doing</a:t>
+            </a:r>
+          </a:p>
+        </p:txBody>
+      </p:sp>
+      <p:sp>
+        <p:nvSpPr>
+          <p:cNvPr id="71" name="Google Shape;71;p15">
+            <a:extLst>
+              <a:ext uri="{FF2B5EF4-FFF2-40B4-BE49-F238E27FC236}">
+                <a16:creationId xmlns:a16="http://schemas.microsoft.com/office/drawing/2014/main" id="{827E2E99-C7E9-8D54-84DB-11BE8A96D810}"/>
+              </a:ext>
+            </a:extLst>
+          </p:cNvPr>
+          <p:cNvSpPr/>
+          <p:nvPr/>
+        </p:nvSpPr>
+        <p:spPr>
+          <a:xfrm>
+            <a:off x="15532407" y="84312"/>
+            <a:ext cx="2410800" cy="480900"/>
+          </a:xfrm>
+          <a:prstGeom prst="roundRect">
+            <a:avLst>
+              <a:gd name="adj" fmla="val 16667"/>
+            </a:avLst>
+          </a:prstGeom>
+          <a:solidFill>
+            <a:srgbClr val="F9CB9C"/>
+          </a:solidFill>
+          <a:ln w="28575" cap="flat" cmpd="sng">
+            <a:solidFill>
+              <a:srgbClr val="B45F06"/>
+            </a:solidFill>
+            <a:prstDash val="solid"/>
+            <a:round/>
+            <a:headEnd type="none" w="sm" len="sm"/>
+            <a:tailEnd type="none" w="sm" len="sm"/>
+          </a:ln>
+        </p:spPr>
+        <p:txBody>
+          <a:bodyPr spcFirstLastPara="1" wrap="square" lIns="91425" tIns="91425" rIns="91425" bIns="91425" anchor="ctr" anchorCtr="0">
+            <a:noAutofit/>
+          </a:bodyPr>
+          <a:lstStyle/>
+          <a:p>
+            <a:pPr marL="0" lvl="0" indent="0" algn="ctr" rtl="0">
+              <a:spcBef>
+                <a:spcPts val="0"/>
+              </a:spcBef>
+              <a:spcAft>
+                <a:spcPts val="0"/>
+              </a:spcAft>
+              <a:buNone/>
+            </a:pPr>
+            <a:r>
+              <a:rPr lang="en-US" sz="1800" b="1" noProof="0" dirty="0">
+                <a:latin typeface="Consolas"/>
+                <a:ea typeface="Consolas"/>
+                <a:cs typeface="Consolas"/>
+                <a:sym typeface="Consolas"/>
+              </a:rPr>
+              <a:t>Review</a:t>
+            </a:r>
+          </a:p>
+        </p:txBody>
+      </p:sp>
+      <p:sp>
+        <p:nvSpPr>
+          <p:cNvPr id="72" name="Google Shape;72;p15">
+            <a:extLst>
+              <a:ext uri="{FF2B5EF4-FFF2-40B4-BE49-F238E27FC236}">
+                <a16:creationId xmlns:a16="http://schemas.microsoft.com/office/drawing/2014/main" id="{3C58E7C6-10E7-E2C1-C5FE-A846E422D419}"/>
+              </a:ext>
+            </a:extLst>
+          </p:cNvPr>
+          <p:cNvSpPr/>
+          <p:nvPr/>
+        </p:nvSpPr>
+        <p:spPr>
+          <a:xfrm>
+            <a:off x="18668888" y="84312"/>
+            <a:ext cx="2410800" cy="480900"/>
+          </a:xfrm>
+          <a:prstGeom prst="roundRect">
+            <a:avLst>
+              <a:gd name="adj" fmla="val 16667"/>
+            </a:avLst>
+          </a:prstGeom>
+          <a:solidFill>
+            <a:srgbClr val="F9CB9C"/>
+          </a:solidFill>
+          <a:ln w="28575" cap="flat" cmpd="sng">
+            <a:solidFill>
+              <a:srgbClr val="B45F06"/>
+            </a:solidFill>
+            <a:prstDash val="solid"/>
+            <a:round/>
+            <a:headEnd type="none" w="sm" len="sm"/>
+            <a:tailEnd type="none" w="sm" len="sm"/>
+          </a:ln>
+        </p:spPr>
+        <p:txBody>
+          <a:bodyPr spcFirstLastPara="1" wrap="square" lIns="91425" tIns="91425" rIns="91425" bIns="91425" anchor="ctr" anchorCtr="0">
+            <a:noAutofit/>
+          </a:bodyPr>
+          <a:lstStyle/>
+          <a:p>
+            <a:pPr marL="0" lvl="0" indent="0" algn="ctr" rtl="0">
+              <a:spcBef>
+                <a:spcPts val="0"/>
+              </a:spcBef>
+              <a:spcAft>
+                <a:spcPts val="0"/>
+              </a:spcAft>
+              <a:buNone/>
+            </a:pPr>
+            <a:r>
+              <a:rPr lang="en-US" sz="1800" b="1" noProof="0" dirty="0">
+                <a:latin typeface="Consolas"/>
+                <a:ea typeface="Consolas"/>
+                <a:cs typeface="Consolas"/>
+                <a:sym typeface="Consolas"/>
+              </a:rPr>
+              <a:t>Done</a:t>
+            </a:r>
+          </a:p>
+        </p:txBody>
+      </p:sp>
+      <p:sp>
+        <p:nvSpPr>
+          <p:cNvPr id="73" name="Google Shape;73;p15">
+            <a:extLst>
+              <a:ext uri="{FF2B5EF4-FFF2-40B4-BE49-F238E27FC236}">
+                <a16:creationId xmlns:a16="http://schemas.microsoft.com/office/drawing/2014/main" id="{70C1A4D9-116B-8266-E3C4-B0C6A1E119A2}"/>
+              </a:ext>
+            </a:extLst>
+          </p:cNvPr>
+          <p:cNvSpPr/>
+          <p:nvPr/>
+        </p:nvSpPr>
+        <p:spPr>
+          <a:xfrm>
+            <a:off x="167288" y="84312"/>
+            <a:ext cx="2410800" cy="480900"/>
+          </a:xfrm>
+          <a:prstGeom prst="roundRect">
+            <a:avLst>
+              <a:gd name="adj" fmla="val 16667"/>
+            </a:avLst>
+          </a:prstGeom>
+          <a:solidFill>
+            <a:srgbClr val="F9CB9C"/>
+          </a:solidFill>
+          <a:ln w="28575" cap="flat" cmpd="sng">
+            <a:solidFill>
+              <a:srgbClr val="B45F06"/>
+            </a:solidFill>
+            <a:prstDash val="solid"/>
+            <a:round/>
+            <a:headEnd type="none" w="sm" len="sm"/>
+            <a:tailEnd type="none" w="sm" len="sm"/>
+          </a:ln>
+        </p:spPr>
+        <p:txBody>
+          <a:bodyPr spcFirstLastPara="1" wrap="square" lIns="91425" tIns="91425" rIns="91425" bIns="91425" anchor="ctr" anchorCtr="0">
+            <a:noAutofit/>
+          </a:bodyPr>
+          <a:lstStyle/>
+          <a:p>
+            <a:pPr marL="0" lvl="0" indent="0" algn="ctr" rtl="0">
+              <a:spcBef>
+                <a:spcPts val="0"/>
+              </a:spcBef>
+              <a:spcAft>
+                <a:spcPts val="0"/>
+              </a:spcAft>
+              <a:buNone/>
+            </a:pPr>
+            <a:r>
+              <a:rPr lang="en-US" sz="1800" b="1" noProof="0" dirty="0">
+                <a:latin typeface="Consolas"/>
+                <a:ea typeface="Consolas"/>
+                <a:cs typeface="Consolas"/>
+                <a:sym typeface="Consolas"/>
+              </a:rPr>
+              <a:t>Backlog</a:t>
+            </a:r>
+          </a:p>
+        </p:txBody>
+      </p:sp>
+      <p:sp>
+        <p:nvSpPr>
+          <p:cNvPr id="74" name="Google Shape;74;p15">
+            <a:extLst>
+              <a:ext uri="{FF2B5EF4-FFF2-40B4-BE49-F238E27FC236}">
+                <a16:creationId xmlns:a16="http://schemas.microsoft.com/office/drawing/2014/main" id="{17D70D43-3065-7DB1-3737-01984A0A574F}"/>
+              </a:ext>
+            </a:extLst>
+          </p:cNvPr>
+          <p:cNvSpPr/>
+          <p:nvPr/>
+        </p:nvSpPr>
+        <p:spPr>
+          <a:xfrm>
+            <a:off x="3259795" y="5171402"/>
+            <a:ext cx="2410800" cy="480900"/>
+          </a:xfrm>
+          <a:prstGeom prst="roundRect">
+            <a:avLst>
+              <a:gd name="adj" fmla="val 16667"/>
+            </a:avLst>
+          </a:prstGeom>
+          <a:solidFill>
+            <a:srgbClr val="E6B8AF"/>
+          </a:solidFill>
+          <a:ln w="28575" cap="flat" cmpd="sng">
+            <a:solidFill>
+              <a:srgbClr val="5B0F00"/>
+            </a:solidFill>
+            <a:prstDash val="solid"/>
+            <a:round/>
+            <a:headEnd type="none" w="sm" len="sm"/>
+            <a:tailEnd type="none" w="sm" len="sm"/>
+          </a:ln>
+        </p:spPr>
+        <p:txBody>
+          <a:bodyPr spcFirstLastPara="1" wrap="square" lIns="91425" tIns="91425" rIns="91425" bIns="91425" anchor="ctr" anchorCtr="0">
+            <a:noAutofit/>
+          </a:bodyPr>
+          <a:lstStyle/>
+          <a:p>
+            <a:pPr marL="0" lvl="0" indent="0" algn="ctr" rtl="0">
+              <a:spcBef>
+                <a:spcPts val="0"/>
+              </a:spcBef>
+              <a:spcAft>
+                <a:spcPts val="0"/>
+              </a:spcAft>
+              <a:buNone/>
+            </a:pPr>
+            <a:r>
+              <a:rPr lang="en-US" sz="1800" b="1" noProof="0" dirty="0">
+                <a:latin typeface="Consolas"/>
+                <a:ea typeface="Consolas"/>
+                <a:cs typeface="Consolas"/>
+                <a:sym typeface="Consolas"/>
+              </a:rPr>
+              <a:t>Everyone</a:t>
+            </a:r>
+          </a:p>
+        </p:txBody>
+      </p:sp>
+      <p:sp>
+        <p:nvSpPr>
+          <p:cNvPr id="3" name="Google Shape;90;p15">
+            <a:extLst>
+              <a:ext uri="{FF2B5EF4-FFF2-40B4-BE49-F238E27FC236}">
+                <a16:creationId xmlns:a16="http://schemas.microsoft.com/office/drawing/2014/main" id="{919C0D28-0616-3DE7-CACF-12FC6A356B13}"/>
+              </a:ext>
+            </a:extLst>
+          </p:cNvPr>
+          <p:cNvSpPr/>
+          <p:nvPr/>
+        </p:nvSpPr>
+        <p:spPr>
+          <a:xfrm>
+            <a:off x="18668888" y="849419"/>
+            <a:ext cx="2410800" cy="1648500"/>
+          </a:xfrm>
+          <a:prstGeom prst="roundRect">
+            <a:avLst>
+              <a:gd name="adj" fmla="val 16667"/>
+            </a:avLst>
+          </a:prstGeom>
+          <a:solidFill>
+            <a:srgbClr val="D0E0E3"/>
+          </a:solidFill>
+          <a:ln w="28575" cap="flat" cmpd="sng">
+            <a:solidFill>
+              <a:srgbClr val="134F5C"/>
+            </a:solidFill>
+            <a:prstDash val="solid"/>
+            <a:round/>
+            <a:headEnd type="none" w="sm" len="sm"/>
+            <a:tailEnd type="none" w="sm" len="sm"/>
+          </a:ln>
+        </p:spPr>
+        <p:txBody>
+          <a:bodyPr spcFirstLastPara="1" wrap="square" lIns="91425" tIns="91425" rIns="91425" bIns="91425" anchor="t" anchorCtr="0">
+            <a:noAutofit/>
+          </a:bodyPr>
+          <a:lstStyle/>
+          <a:p>
+            <a:pPr marL="0" lvl="0" indent="0" algn="l" rtl="0">
+              <a:spcBef>
+                <a:spcPts val="0"/>
+              </a:spcBef>
+              <a:spcAft>
+                <a:spcPts val="0"/>
+              </a:spcAft>
+              <a:buNone/>
+            </a:pPr>
+            <a:r>
+              <a:rPr lang="en-US" noProof="0" dirty="0">
+                <a:latin typeface="Consolas"/>
+                <a:ea typeface="Consolas"/>
+                <a:cs typeface="Consolas"/>
+                <a:sym typeface="Consolas"/>
+              </a:rPr>
+              <a:t>T2: Everyone: Playing the game so we can experience the user’s needs.</a:t>
+            </a:r>
+          </a:p>
+        </p:txBody>
+      </p:sp>
+      <p:sp>
+        <p:nvSpPr>
+          <p:cNvPr id="2" name="Google Shape;88;p15">
+            <a:extLst>
+              <a:ext uri="{FF2B5EF4-FFF2-40B4-BE49-F238E27FC236}">
+                <a16:creationId xmlns:a16="http://schemas.microsoft.com/office/drawing/2014/main" id="{F0222103-F6FD-7506-F284-A70EDA3AE1B8}"/>
+              </a:ext>
+            </a:extLst>
+          </p:cNvPr>
+          <p:cNvSpPr/>
+          <p:nvPr/>
+        </p:nvSpPr>
+        <p:spPr>
+          <a:xfrm>
+            <a:off x="18668888" y="1957876"/>
+            <a:ext cx="2410800" cy="1648500"/>
+          </a:xfrm>
+          <a:prstGeom prst="roundRect">
+            <a:avLst>
+              <a:gd name="adj" fmla="val 16667"/>
+            </a:avLst>
+          </a:prstGeom>
+          <a:solidFill>
+            <a:srgbClr val="D9EAD3"/>
+          </a:solidFill>
+          <a:ln w="28575" cap="flat" cmpd="sng">
+            <a:solidFill>
+              <a:srgbClr val="274E13"/>
+            </a:solidFill>
+            <a:prstDash val="solid"/>
+            <a:round/>
+            <a:headEnd type="none" w="sm" len="sm"/>
+            <a:tailEnd type="none" w="sm" len="sm"/>
+          </a:ln>
+        </p:spPr>
+        <p:txBody>
+          <a:bodyPr spcFirstLastPara="1" wrap="square" lIns="91425" tIns="91425" rIns="91425" bIns="91425" anchor="t" anchorCtr="0">
+            <a:noAutofit/>
+          </a:bodyPr>
+          <a:lstStyle/>
+          <a:p>
+            <a:pPr marL="0" lvl="0" indent="0" algn="l" rtl="0">
+              <a:spcBef>
+                <a:spcPts val="0"/>
+              </a:spcBef>
+              <a:spcAft>
+                <a:spcPts val="0"/>
+              </a:spcAft>
+              <a:buNone/>
+            </a:pPr>
+            <a:r>
+              <a:rPr lang="en-US" noProof="0" dirty="0">
+                <a:latin typeface="Consolas"/>
+                <a:ea typeface="Consolas"/>
+                <a:cs typeface="Consolas"/>
+                <a:sym typeface="Consolas"/>
+              </a:rPr>
+              <a:t>T1: Make 3 User Stories</a:t>
+            </a:r>
+          </a:p>
+        </p:txBody>
+      </p:sp>
+      <p:sp>
+        <p:nvSpPr>
+          <p:cNvPr id="88" name="Google Shape;88;p15">
+            <a:extLst>
+              <a:ext uri="{FF2B5EF4-FFF2-40B4-BE49-F238E27FC236}">
+                <a16:creationId xmlns:a16="http://schemas.microsoft.com/office/drawing/2014/main" id="{06593A07-F83B-20D4-F939-0170E9253D99}"/>
+              </a:ext>
+            </a:extLst>
+          </p:cNvPr>
+          <p:cNvSpPr/>
+          <p:nvPr/>
+        </p:nvSpPr>
+        <p:spPr>
+          <a:xfrm>
+            <a:off x="18668887" y="2681513"/>
+            <a:ext cx="2491725" cy="1101556"/>
+          </a:xfrm>
+          <a:prstGeom prst="roundRect">
+            <a:avLst>
+              <a:gd name="adj" fmla="val 16667"/>
+            </a:avLst>
+          </a:prstGeom>
+          <a:solidFill>
+            <a:srgbClr val="D9EAD3"/>
+          </a:solidFill>
+          <a:ln w="28575" cap="flat" cmpd="sng">
+            <a:solidFill>
+              <a:srgbClr val="274E13"/>
+            </a:solidFill>
+            <a:prstDash val="solid"/>
+            <a:round/>
+            <a:headEnd type="none" w="sm" len="sm"/>
+            <a:tailEnd type="none" w="sm" len="sm"/>
+          </a:ln>
+        </p:spPr>
+        <p:txBody>
+          <a:bodyPr spcFirstLastPara="1" wrap="square" lIns="91425" tIns="91425" rIns="91425" bIns="91425" anchor="t" anchorCtr="0">
+            <a:noAutofit/>
+          </a:bodyPr>
+          <a:lstStyle/>
+          <a:p>
+            <a:pPr marL="0" lvl="0" indent="0" algn="l" rtl="0">
+              <a:spcBef>
+                <a:spcPts val="0"/>
+              </a:spcBef>
+              <a:spcAft>
+                <a:spcPts val="0"/>
+              </a:spcAft>
+              <a:buNone/>
+            </a:pPr>
+            <a:r>
+              <a:rPr lang="en-US" noProof="0" dirty="0">
+                <a:latin typeface="Consolas"/>
+                <a:ea typeface="Consolas"/>
+                <a:cs typeface="Consolas"/>
+                <a:sym typeface="Consolas"/>
+              </a:rPr>
+              <a:t>Find code smells</a:t>
+            </a:r>
+          </a:p>
+        </p:txBody>
+      </p:sp>
+      <p:cxnSp>
+        <p:nvCxnSpPr>
+          <p:cNvPr id="91" name="Google Shape;91;p15">
+            <a:extLst>
+              <a:ext uri="{FF2B5EF4-FFF2-40B4-BE49-F238E27FC236}">
+                <a16:creationId xmlns:a16="http://schemas.microsoft.com/office/drawing/2014/main" id="{B0C1267D-3FF4-A354-352F-275280364C2B}"/>
+              </a:ext>
+            </a:extLst>
+          </p:cNvPr>
+          <p:cNvCxnSpPr/>
+          <p:nvPr/>
+        </p:nvCxnSpPr>
+        <p:spPr>
+          <a:xfrm>
+            <a:off x="2874374" y="-28500"/>
+            <a:ext cx="0" cy="10857000"/>
+          </a:xfrm>
+          <a:prstGeom prst="straightConnector1">
+            <a:avLst/>
+          </a:prstGeom>
+          <a:noFill/>
+          <a:ln w="38100" cap="flat" cmpd="sng">
+            <a:solidFill>
+              <a:srgbClr val="5B0F00"/>
+            </a:solidFill>
+            <a:prstDash val="solid"/>
+            <a:round/>
+            <a:headEnd type="none" w="med" len="med"/>
+            <a:tailEnd type="none" w="med" len="med"/>
+          </a:ln>
+        </p:spPr>
+      </p:cxnSp>
+      <p:sp>
+        <p:nvSpPr>
+          <p:cNvPr id="4" name="Google Shape;88;p15">
+            <a:extLst>
+              <a:ext uri="{FF2B5EF4-FFF2-40B4-BE49-F238E27FC236}">
+                <a16:creationId xmlns:a16="http://schemas.microsoft.com/office/drawing/2014/main" id="{50C71590-C854-E682-9894-F86DB833D9B3}"/>
+              </a:ext>
+            </a:extLst>
+          </p:cNvPr>
+          <p:cNvSpPr/>
+          <p:nvPr/>
+        </p:nvSpPr>
+        <p:spPr>
+          <a:xfrm>
+            <a:off x="405410" y="694221"/>
+            <a:ext cx="1867580" cy="3160613"/>
+          </a:xfrm>
+          <a:prstGeom prst="roundRect">
+            <a:avLst>
+              <a:gd name="adj" fmla="val 16667"/>
+            </a:avLst>
+          </a:prstGeom>
+          <a:solidFill>
+            <a:srgbClr val="D9EAD3"/>
+          </a:solidFill>
+          <a:ln w="28575" cap="flat" cmpd="sng">
+            <a:solidFill>
+              <a:srgbClr val="274E13"/>
+            </a:solidFill>
+            <a:prstDash val="solid"/>
+            <a:round/>
+            <a:headEnd type="none" w="sm" len="sm"/>
+            <a:tailEnd type="none" w="sm" len="sm"/>
+          </a:ln>
+        </p:spPr>
+        <p:txBody>
+          <a:bodyPr spcFirstLastPara="1" wrap="square" lIns="91425" tIns="91425" rIns="91425" bIns="91425" anchor="t" anchorCtr="0">
+            <a:noAutofit/>
+          </a:bodyPr>
+          <a:lstStyle/>
+          <a:p>
+            <a:pPr lvl="0"/>
+            <a:r>
+              <a:rPr lang="en-US" noProof="0" dirty="0">
+                <a:latin typeface="Consolas" panose="020B0609020204030204" pitchFamily="49" charset="0"/>
+                <a:ea typeface="Consolas"/>
+                <a:cs typeface="Consolas"/>
+                <a:sym typeface="Consolas"/>
+              </a:rPr>
+              <a:t>US 3:</a:t>
+            </a:r>
+            <a:r>
+              <a:rPr lang="en-US" noProof="0" dirty="0">
+                <a:latin typeface="Consolas" panose="020B0609020204030204" pitchFamily="49" charset="0"/>
+              </a:rPr>
+              <a:t>As a player brand new to Mindustry, I want a more intuitive game tutorial so that I don't get lost and demotivated</a:t>
+            </a:r>
+            <a:r>
+              <a:rPr lang="en-US" noProof="0" dirty="0"/>
+              <a:t>.</a:t>
+            </a:r>
+            <a:endParaRPr lang="en-US" noProof="0" dirty="0">
+              <a:latin typeface="Consolas"/>
+              <a:ea typeface="Consolas"/>
+              <a:cs typeface="Consolas"/>
+              <a:sym typeface="Consolas"/>
+            </a:endParaRPr>
+          </a:p>
+        </p:txBody>
+      </p:sp>
+      <p:sp>
+        <p:nvSpPr>
+          <p:cNvPr id="5" name="Google Shape;88;p15">
+            <a:extLst>
+              <a:ext uri="{FF2B5EF4-FFF2-40B4-BE49-F238E27FC236}">
+                <a16:creationId xmlns:a16="http://schemas.microsoft.com/office/drawing/2014/main" id="{BA531632-2D81-EF96-BFC1-0F5AA8C4C7EF}"/>
+              </a:ext>
+            </a:extLst>
+          </p:cNvPr>
+          <p:cNvSpPr/>
+          <p:nvPr/>
+        </p:nvSpPr>
+        <p:spPr>
+          <a:xfrm>
+            <a:off x="438912" y="4038458"/>
+            <a:ext cx="1867552" cy="2826314"/>
+          </a:xfrm>
+          <a:prstGeom prst="roundRect">
+            <a:avLst>
+              <a:gd name="adj" fmla="val 16667"/>
+            </a:avLst>
+          </a:prstGeom>
+          <a:solidFill>
+            <a:srgbClr val="D9EAD3"/>
+          </a:solidFill>
+          <a:ln w="28575" cap="flat" cmpd="sng">
+            <a:solidFill>
+              <a:srgbClr val="274E13"/>
+            </a:solidFill>
+            <a:prstDash val="solid"/>
+            <a:round/>
+            <a:headEnd type="none" w="sm" len="sm"/>
+            <a:tailEnd type="none" w="sm" len="sm"/>
+          </a:ln>
+        </p:spPr>
+        <p:txBody>
+          <a:bodyPr spcFirstLastPara="1" wrap="square" lIns="91425" tIns="91425" rIns="91425" bIns="91425" anchor="t" anchorCtr="0">
+            <a:noAutofit/>
+          </a:bodyPr>
+          <a:lstStyle/>
+          <a:p>
+            <a:pPr lvl="0"/>
+            <a:r>
+              <a:rPr lang="en-US">
+                <a:latin typeface="Consolas"/>
+                <a:ea typeface="Consolas"/>
+                <a:cs typeface="Consolas"/>
+                <a:sym typeface="Consolas"/>
+              </a:rPr>
+              <a:t>US 2: As an experienced player I want to have a greater diversity of towers that can help me automate the way I defend orders.</a:t>
+            </a:r>
+            <a:endParaRPr lang="en-US" dirty="0">
+              <a:latin typeface="Consolas"/>
+              <a:ea typeface="Consolas"/>
+              <a:cs typeface="Consolas"/>
+              <a:sym typeface="Consolas"/>
+            </a:endParaRPr>
+          </a:p>
+        </p:txBody>
+      </p:sp>
+      <p:sp>
+        <p:nvSpPr>
+          <p:cNvPr id="6" name="Google Shape;88;p15">
+            <a:extLst>
+              <a:ext uri="{FF2B5EF4-FFF2-40B4-BE49-F238E27FC236}">
+                <a16:creationId xmlns:a16="http://schemas.microsoft.com/office/drawing/2014/main" id="{D1DE3625-C2E8-4561-8578-B61EBAAE8483}"/>
+              </a:ext>
+            </a:extLst>
+          </p:cNvPr>
+          <p:cNvSpPr/>
+          <p:nvPr/>
+        </p:nvSpPr>
+        <p:spPr>
+          <a:xfrm>
+            <a:off x="405410" y="6982925"/>
+            <a:ext cx="1867580" cy="3732526"/>
+          </a:xfrm>
+          <a:prstGeom prst="roundRect">
+            <a:avLst>
+              <a:gd name="adj" fmla="val 16667"/>
+            </a:avLst>
+          </a:prstGeom>
+          <a:solidFill>
+            <a:srgbClr val="D9EAD3"/>
+          </a:solidFill>
+          <a:ln w="28575" cap="flat" cmpd="sng">
+            <a:solidFill>
+              <a:srgbClr val="274E13"/>
+            </a:solidFill>
+            <a:prstDash val="solid"/>
+            <a:round/>
+            <a:headEnd type="none" w="sm" len="sm"/>
+            <a:tailEnd type="none" w="sm" len="sm"/>
+          </a:ln>
+        </p:spPr>
+        <p:txBody>
+          <a:bodyPr spcFirstLastPara="1" wrap="square" lIns="91425" tIns="91425" rIns="91425" bIns="91425" anchor="t" anchorCtr="0">
+            <a:noAutofit/>
+          </a:bodyPr>
+          <a:lstStyle/>
+          <a:p>
+            <a:r>
+              <a:rPr lang="en-US" noProof="0" dirty="0">
+                <a:latin typeface="Consolas" panose="020B0609020204030204" pitchFamily="49" charset="0"/>
+                <a:ea typeface="Consolas"/>
+                <a:cs typeface="Consolas"/>
+                <a:sym typeface="Consolas"/>
+              </a:rPr>
+              <a:t>US 1: </a:t>
+            </a:r>
+            <a:r>
+              <a:rPr lang="en-US" dirty="0">
+                <a:latin typeface="Consolas" panose="020B0609020204030204" pitchFamily="49" charset="0"/>
+              </a:rPr>
+              <a:t>As a player, I want to be able to place customizable markers on the map to identify important areas, so that I can better organize my base and communicate with myself throughout the game.</a:t>
+            </a:r>
+          </a:p>
+          <a:p>
+            <a:pPr marL="0" lvl="0" indent="0" algn="l" rtl="0">
+              <a:spcBef>
+                <a:spcPts val="0"/>
+              </a:spcBef>
+              <a:spcAft>
+                <a:spcPts val="0"/>
+              </a:spcAft>
+              <a:buNone/>
+            </a:pPr>
+            <a:endParaRPr lang="en-US" noProof="0" dirty="0">
+              <a:latin typeface="Consolas"/>
+              <a:ea typeface="Consolas"/>
+              <a:cs typeface="Consolas"/>
+              <a:sym typeface="Consolas"/>
+            </a:endParaRPr>
+          </a:p>
+        </p:txBody>
+      </p:sp>
+      <p:sp>
+        <p:nvSpPr>
+          <p:cNvPr id="9" name="Google Shape;88;p15">
+            <a:extLst>
+              <a:ext uri="{FF2B5EF4-FFF2-40B4-BE49-F238E27FC236}">
+                <a16:creationId xmlns:a16="http://schemas.microsoft.com/office/drawing/2014/main" id="{92E933E9-CCB1-5519-2203-2BFBF6FD5F17}"/>
+              </a:ext>
+            </a:extLst>
+          </p:cNvPr>
+          <p:cNvSpPr/>
+          <p:nvPr/>
+        </p:nvSpPr>
+        <p:spPr>
+          <a:xfrm>
+            <a:off x="18683637" y="3151744"/>
+            <a:ext cx="2525225" cy="837555"/>
+          </a:xfrm>
+          <a:prstGeom prst="roundRect">
+            <a:avLst>
+              <a:gd name="adj" fmla="val 16667"/>
+            </a:avLst>
+          </a:prstGeom>
+          <a:solidFill>
+            <a:srgbClr val="D9EAD3"/>
+          </a:solidFill>
+          <a:ln w="28575" cap="flat" cmpd="sng">
+            <a:solidFill>
+              <a:srgbClr val="274E13"/>
+            </a:solidFill>
+            <a:prstDash val="solid"/>
+            <a:round/>
+            <a:headEnd type="none" w="sm" len="sm"/>
+            <a:tailEnd type="none" w="sm" len="sm"/>
+          </a:ln>
+        </p:spPr>
+        <p:txBody>
+          <a:bodyPr spcFirstLastPara="1" wrap="square" lIns="91425" tIns="91425" rIns="91425" bIns="91425" anchor="t" anchorCtr="0">
+            <a:noAutofit/>
+          </a:bodyPr>
+          <a:lstStyle/>
+          <a:p>
+            <a:pPr marL="0" lvl="0" indent="0" algn="l" rtl="0">
+              <a:spcBef>
+                <a:spcPts val="0"/>
+              </a:spcBef>
+              <a:spcAft>
+                <a:spcPts val="0"/>
+              </a:spcAft>
+              <a:buNone/>
+            </a:pPr>
+            <a:r>
+              <a:rPr lang="en-US" noProof="0" dirty="0">
+                <a:latin typeface="Consolas"/>
+                <a:ea typeface="Consolas"/>
+                <a:cs typeface="Consolas"/>
+                <a:sym typeface="Consolas"/>
+              </a:rPr>
+              <a:t>Identify Design Patterns</a:t>
+            </a:r>
+          </a:p>
+        </p:txBody>
+      </p:sp>
+      <p:sp>
+        <p:nvSpPr>
+          <p:cNvPr id="7" name="Google Shape;88;p15">
+            <a:extLst>
+              <a:ext uri="{FF2B5EF4-FFF2-40B4-BE49-F238E27FC236}">
+                <a16:creationId xmlns:a16="http://schemas.microsoft.com/office/drawing/2014/main" id="{DC692B73-06FC-5991-C5F6-A9592A00790B}"/>
+              </a:ext>
+            </a:extLst>
+          </p:cNvPr>
+          <p:cNvSpPr/>
+          <p:nvPr/>
+        </p:nvSpPr>
+        <p:spPr>
+          <a:xfrm>
+            <a:off x="18667367" y="3895475"/>
+            <a:ext cx="2493245" cy="837555"/>
+          </a:xfrm>
+          <a:prstGeom prst="roundRect">
+            <a:avLst>
+              <a:gd name="adj" fmla="val 16667"/>
+            </a:avLst>
+          </a:prstGeom>
+          <a:solidFill>
+            <a:srgbClr val="D9EAD3"/>
+          </a:solidFill>
+          <a:ln w="28575" cap="flat" cmpd="sng">
+            <a:solidFill>
+              <a:srgbClr val="274E13"/>
+            </a:solidFill>
+            <a:prstDash val="solid"/>
+            <a:round/>
+            <a:headEnd type="none" w="sm" len="sm"/>
+            <a:tailEnd type="none" w="sm" len="sm"/>
+          </a:ln>
+        </p:spPr>
+        <p:txBody>
+          <a:bodyPr spcFirstLastPara="1" wrap="square" lIns="91425" tIns="91425" rIns="91425" bIns="91425" anchor="t" anchorCtr="0">
+            <a:noAutofit/>
+          </a:bodyPr>
+          <a:lstStyle/>
+          <a:p>
+            <a:pPr marL="0" lvl="0" indent="0" algn="l" rtl="0">
+              <a:spcBef>
+                <a:spcPts val="0"/>
+              </a:spcBef>
+              <a:spcAft>
+                <a:spcPts val="0"/>
+              </a:spcAft>
+              <a:buNone/>
+            </a:pPr>
+            <a:r>
+              <a:rPr lang="en-US" noProof="0" dirty="0">
+                <a:latin typeface="Consolas"/>
+                <a:ea typeface="Consolas"/>
+                <a:cs typeface="Consolas"/>
+                <a:sym typeface="Consolas"/>
+              </a:rPr>
+              <a:t>Create Use Case Diagrams</a:t>
+            </a:r>
+          </a:p>
+        </p:txBody>
+      </p:sp>
+      <p:sp>
+        <p:nvSpPr>
+          <p:cNvPr id="12" name="Google Shape;90;p15">
+            <a:extLst>
+              <a:ext uri="{FF2B5EF4-FFF2-40B4-BE49-F238E27FC236}">
+                <a16:creationId xmlns:a16="http://schemas.microsoft.com/office/drawing/2014/main" id="{84C3D82C-90B3-945B-BF53-3BD5A022D15A}"/>
+              </a:ext>
+            </a:extLst>
+          </p:cNvPr>
+          <p:cNvSpPr/>
+          <p:nvPr/>
+        </p:nvSpPr>
+        <p:spPr>
+          <a:xfrm>
+            <a:off x="18633867" y="4583808"/>
+            <a:ext cx="2560243" cy="1464818"/>
+          </a:xfrm>
+          <a:prstGeom prst="roundRect">
+            <a:avLst>
+              <a:gd name="adj" fmla="val 16667"/>
+            </a:avLst>
+          </a:prstGeom>
+          <a:solidFill>
+            <a:srgbClr val="D9EAD3"/>
+          </a:solidFill>
+          <a:ln w="28575" cap="flat" cmpd="sng">
+            <a:solidFill>
+              <a:srgbClr val="134F5C"/>
+            </a:solidFill>
+            <a:prstDash val="solid"/>
+            <a:round/>
+            <a:headEnd type="none" w="sm" len="sm"/>
+            <a:tailEnd type="none" w="sm" len="sm"/>
+          </a:ln>
+        </p:spPr>
+        <p:txBody>
+          <a:bodyPr spcFirstLastPara="1" wrap="square" lIns="91425" tIns="91425" rIns="91425" bIns="91425" anchor="t" anchorCtr="0">
+            <a:noAutofit/>
+          </a:bodyPr>
+          <a:lstStyle/>
+          <a:p>
+            <a:pPr marL="0" lvl="0" indent="0" algn="l" rtl="0">
+              <a:spcBef>
+                <a:spcPts val="0"/>
+              </a:spcBef>
+              <a:spcAft>
+                <a:spcPts val="0"/>
+              </a:spcAft>
+              <a:buNone/>
+            </a:pPr>
+            <a:r>
+              <a:rPr lang="en-US" dirty="0">
+                <a:latin typeface="Consolas"/>
+                <a:ea typeface="Consolas"/>
+                <a:cs typeface="Consolas"/>
+                <a:sym typeface="Consolas"/>
+              </a:rPr>
+              <a:t>Write Codebase Metrics Assessment report</a:t>
+            </a:r>
+            <a:endParaRPr lang="en-US" noProof="0" dirty="0">
+              <a:latin typeface="Consolas"/>
+              <a:ea typeface="Consolas"/>
+              <a:cs typeface="Consolas"/>
+              <a:sym typeface="Consolas"/>
+            </a:endParaRPr>
+          </a:p>
+        </p:txBody>
+      </p:sp>
+      <p:sp>
+        <p:nvSpPr>
+          <p:cNvPr id="10" name="Google Shape;90;p15">
+            <a:extLst>
+              <a:ext uri="{FF2B5EF4-FFF2-40B4-BE49-F238E27FC236}">
+                <a16:creationId xmlns:a16="http://schemas.microsoft.com/office/drawing/2014/main" id="{084A3A09-366B-259A-D0D7-72BCCA2B0CF9}"/>
+              </a:ext>
+            </a:extLst>
+          </p:cNvPr>
+          <p:cNvSpPr/>
+          <p:nvPr/>
+        </p:nvSpPr>
+        <p:spPr>
+          <a:xfrm>
+            <a:off x="18664347" y="5271690"/>
+            <a:ext cx="2495724" cy="1641426"/>
+          </a:xfrm>
+          <a:prstGeom prst="roundRect">
+            <a:avLst>
+              <a:gd name="adj" fmla="val 16667"/>
+            </a:avLst>
+          </a:prstGeom>
+          <a:solidFill>
+            <a:srgbClr val="D9EAD3"/>
+          </a:solidFill>
+          <a:ln w="28575" cap="flat" cmpd="sng">
+            <a:solidFill>
+              <a:srgbClr val="134F5C"/>
+            </a:solidFill>
+            <a:prstDash val="solid"/>
+            <a:round/>
+            <a:headEnd type="none" w="sm" len="sm"/>
+            <a:tailEnd type="none" w="sm" len="sm"/>
+          </a:ln>
+        </p:spPr>
+        <p:txBody>
+          <a:bodyPr spcFirstLastPara="1" wrap="square" lIns="91425" tIns="91425" rIns="91425" bIns="91425" anchor="t" anchorCtr="0">
+            <a:noAutofit/>
+          </a:bodyPr>
+          <a:lstStyle/>
+          <a:p>
+            <a:pPr marL="0" lvl="0" indent="0" algn="l" rtl="0">
+              <a:spcBef>
+                <a:spcPts val="0"/>
+              </a:spcBef>
+              <a:spcAft>
+                <a:spcPts val="0"/>
+              </a:spcAft>
+              <a:buNone/>
+            </a:pPr>
+            <a:r>
+              <a:rPr lang="en-US" dirty="0">
+                <a:latin typeface="Consolas"/>
+                <a:ea typeface="Consolas"/>
+                <a:cs typeface="Consolas"/>
+                <a:sym typeface="Consolas"/>
+              </a:rPr>
+              <a:t>Update all User Stories with final functionalities</a:t>
+            </a:r>
+            <a:endParaRPr lang="en-US" noProof="0" dirty="0">
+              <a:latin typeface="Consolas"/>
+              <a:ea typeface="Consolas"/>
+              <a:cs typeface="Consolas"/>
+              <a:sym typeface="Consolas"/>
+            </a:endParaRPr>
+          </a:p>
+        </p:txBody>
+      </p:sp>
+      <p:sp>
+        <p:nvSpPr>
+          <p:cNvPr id="11" name="Google Shape;90;p15">
+            <a:extLst>
+              <a:ext uri="{FF2B5EF4-FFF2-40B4-BE49-F238E27FC236}">
+                <a16:creationId xmlns:a16="http://schemas.microsoft.com/office/drawing/2014/main" id="{826719A3-7141-E062-83D7-BC0F0C4D3199}"/>
+              </a:ext>
+            </a:extLst>
+          </p:cNvPr>
+          <p:cNvSpPr/>
+          <p:nvPr/>
+        </p:nvSpPr>
+        <p:spPr>
+          <a:xfrm>
+            <a:off x="18664889" y="6220359"/>
+            <a:ext cx="2495723" cy="1561107"/>
+          </a:xfrm>
+          <a:prstGeom prst="roundRect">
+            <a:avLst>
+              <a:gd name="adj" fmla="val 16667"/>
+            </a:avLst>
+          </a:prstGeom>
+          <a:solidFill>
+            <a:srgbClr val="D9EAD3"/>
+          </a:solidFill>
+          <a:ln w="28575" cap="flat" cmpd="sng">
+            <a:solidFill>
+              <a:srgbClr val="134F5C"/>
+            </a:solidFill>
+            <a:prstDash val="solid"/>
+            <a:round/>
+            <a:headEnd type="none" w="sm" len="sm"/>
+            <a:tailEnd type="none" w="sm" len="sm"/>
+          </a:ln>
+        </p:spPr>
+        <p:txBody>
+          <a:bodyPr spcFirstLastPara="1" wrap="square" lIns="91425" tIns="91425" rIns="91425" bIns="91425" anchor="t" anchorCtr="0">
+            <a:noAutofit/>
+          </a:bodyPr>
+          <a:lstStyle/>
+          <a:p>
+            <a:pPr marL="0" lvl="0" indent="0" algn="l" rtl="0">
+              <a:spcBef>
+                <a:spcPts val="0"/>
+              </a:spcBef>
+              <a:spcAft>
+                <a:spcPts val="0"/>
+              </a:spcAft>
+              <a:buNone/>
+            </a:pPr>
+            <a:r>
+              <a:rPr lang="en-US" noProof="0" dirty="0">
+                <a:latin typeface="Consolas"/>
+                <a:ea typeface="Consolas"/>
+                <a:cs typeface="Consolas"/>
+                <a:sym typeface="Consolas"/>
+              </a:rPr>
+              <a:t>Create User Cases Diagrams for each User Story</a:t>
+            </a:r>
+          </a:p>
+        </p:txBody>
+      </p:sp>
+      <p:sp>
+        <p:nvSpPr>
+          <p:cNvPr id="13" name="Google Shape;90;p15">
+            <a:extLst>
+              <a:ext uri="{FF2B5EF4-FFF2-40B4-BE49-F238E27FC236}">
+                <a16:creationId xmlns:a16="http://schemas.microsoft.com/office/drawing/2014/main" id="{0520B1BC-ADED-A759-A7C8-7BD4EA967D36}"/>
+              </a:ext>
+            </a:extLst>
+          </p:cNvPr>
+          <p:cNvSpPr/>
+          <p:nvPr/>
+        </p:nvSpPr>
+        <p:spPr>
+          <a:xfrm>
+            <a:off x="18683637" y="7093495"/>
+            <a:ext cx="2495722" cy="1278780"/>
+          </a:xfrm>
+          <a:prstGeom prst="roundRect">
+            <a:avLst>
+              <a:gd name="adj" fmla="val 16667"/>
+            </a:avLst>
+          </a:prstGeom>
+          <a:solidFill>
+            <a:srgbClr val="D9EAD3"/>
+          </a:solidFill>
+          <a:ln w="28575" cap="flat" cmpd="sng">
+            <a:solidFill>
+              <a:srgbClr val="134F5C"/>
+            </a:solidFill>
+            <a:prstDash val="solid"/>
+            <a:round/>
+            <a:headEnd type="none" w="sm" len="sm"/>
+            <a:tailEnd type="none" w="sm" len="sm"/>
+          </a:ln>
+        </p:spPr>
+        <p:txBody>
+          <a:bodyPr spcFirstLastPara="1" wrap="square" lIns="91425" tIns="91425" rIns="91425" bIns="91425" anchor="t" anchorCtr="0">
+            <a:noAutofit/>
+          </a:bodyPr>
+          <a:lstStyle/>
+          <a:p>
+            <a:pPr marL="0" lvl="0" indent="0" algn="l" rtl="0">
+              <a:spcBef>
+                <a:spcPts val="0"/>
+              </a:spcBef>
+              <a:spcAft>
+                <a:spcPts val="0"/>
+              </a:spcAft>
+              <a:buNone/>
+            </a:pPr>
+            <a:r>
+              <a:rPr lang="en-US" noProof="0" dirty="0">
+                <a:latin typeface="Consolas"/>
+                <a:ea typeface="Consolas"/>
+                <a:cs typeface="Consolas"/>
+                <a:sym typeface="Consolas"/>
+              </a:rPr>
+              <a:t>Write Use Case textual descriptions</a:t>
+            </a:r>
+          </a:p>
+        </p:txBody>
+      </p:sp>
+      <p:sp>
+        <p:nvSpPr>
+          <p:cNvPr id="15" name="Google Shape;90;p15">
+            <a:extLst>
+              <a:ext uri="{FF2B5EF4-FFF2-40B4-BE49-F238E27FC236}">
+                <a16:creationId xmlns:a16="http://schemas.microsoft.com/office/drawing/2014/main" id="{F96759B6-9AA3-F7E6-8680-4D0E6F7E89A0}"/>
+              </a:ext>
+            </a:extLst>
+          </p:cNvPr>
+          <p:cNvSpPr/>
+          <p:nvPr/>
+        </p:nvSpPr>
+        <p:spPr>
+          <a:xfrm>
+            <a:off x="18664347" y="7801665"/>
+            <a:ext cx="2495724" cy="1641426"/>
+          </a:xfrm>
+          <a:prstGeom prst="roundRect">
+            <a:avLst>
+              <a:gd name="adj" fmla="val 16667"/>
+            </a:avLst>
+          </a:prstGeom>
+          <a:solidFill>
+            <a:srgbClr val="D9EAD3"/>
+          </a:solidFill>
+          <a:ln w="28575" cap="flat" cmpd="sng">
+            <a:solidFill>
+              <a:srgbClr val="134F5C"/>
+            </a:solidFill>
+            <a:prstDash val="solid"/>
+            <a:round/>
+            <a:headEnd type="none" w="sm" len="sm"/>
+            <a:tailEnd type="none" w="sm" len="sm"/>
+          </a:ln>
+        </p:spPr>
+        <p:txBody>
+          <a:bodyPr spcFirstLastPara="1" wrap="square" lIns="91425" tIns="91425" rIns="91425" bIns="91425" anchor="t" anchorCtr="0">
+            <a:noAutofit/>
+          </a:bodyPr>
+          <a:lstStyle/>
+          <a:p>
+            <a:pPr marL="0" lvl="0" indent="0" algn="l" rtl="0">
+              <a:spcBef>
+                <a:spcPts val="0"/>
+              </a:spcBef>
+              <a:spcAft>
+                <a:spcPts val="0"/>
+              </a:spcAft>
+              <a:buNone/>
+            </a:pPr>
+            <a:r>
+              <a:rPr lang="en-US" sz="1800" noProof="0" dirty="0">
+                <a:latin typeface="Consolas"/>
+                <a:ea typeface="Consolas"/>
+                <a:cs typeface="Consolas"/>
+                <a:sym typeface="Consolas"/>
+              </a:rPr>
+              <a:t>Create a first version of the implementation of e</a:t>
+            </a:r>
+            <a:r>
+              <a:rPr lang="en-US" sz="1800" dirty="0">
+                <a:latin typeface="Consolas"/>
+                <a:ea typeface="Consolas"/>
+                <a:cs typeface="Consolas"/>
+                <a:sym typeface="Consolas"/>
+              </a:rPr>
+              <a:t>very User Story</a:t>
+            </a:r>
+            <a:endParaRPr lang="en-US" sz="1800" noProof="0" dirty="0">
+              <a:latin typeface="Consolas"/>
+              <a:ea typeface="Consolas"/>
+              <a:cs typeface="Consolas"/>
+              <a:sym typeface="Consolas"/>
+            </a:endParaRPr>
+          </a:p>
+        </p:txBody>
+      </p:sp>
+      <p:sp>
+        <p:nvSpPr>
+          <p:cNvPr id="8" name="Google Shape;88;p15">
+            <a:extLst>
+              <a:ext uri="{FF2B5EF4-FFF2-40B4-BE49-F238E27FC236}">
+                <a16:creationId xmlns:a16="http://schemas.microsoft.com/office/drawing/2014/main" id="{1D07D497-C80B-1C3A-6831-E8F5A585387A}"/>
+              </a:ext>
+            </a:extLst>
+          </p:cNvPr>
+          <p:cNvSpPr/>
+          <p:nvPr/>
+        </p:nvSpPr>
+        <p:spPr>
+          <a:xfrm>
+            <a:off x="15532407" y="2079141"/>
+            <a:ext cx="2525225" cy="837555"/>
+          </a:xfrm>
+          <a:prstGeom prst="roundRect">
+            <a:avLst>
+              <a:gd name="adj" fmla="val 16667"/>
+            </a:avLst>
+          </a:prstGeom>
+          <a:solidFill>
+            <a:srgbClr val="D9EAD3"/>
+          </a:solidFill>
+          <a:ln w="28575" cap="flat" cmpd="sng">
+            <a:solidFill>
+              <a:srgbClr val="274E13"/>
+            </a:solidFill>
+            <a:prstDash val="solid"/>
+            <a:round/>
+            <a:headEnd type="none" w="sm" len="sm"/>
+            <a:tailEnd type="none" w="sm" len="sm"/>
+          </a:ln>
+        </p:spPr>
+        <p:txBody>
+          <a:bodyPr spcFirstLastPara="1" wrap="square" lIns="91425" tIns="91425" rIns="91425" bIns="91425" anchor="t" anchorCtr="0">
+            <a:noAutofit/>
+          </a:bodyPr>
+          <a:lstStyle/>
+          <a:p>
+            <a:pPr marL="0" lvl="0" indent="0" algn="l" rtl="0">
+              <a:spcBef>
+                <a:spcPts val="0"/>
+              </a:spcBef>
+              <a:spcAft>
+                <a:spcPts val="0"/>
+              </a:spcAft>
+              <a:buNone/>
+            </a:pPr>
+            <a:r>
+              <a:rPr lang="en-US" noProof="0" dirty="0">
+                <a:latin typeface="Consolas"/>
+                <a:ea typeface="Consolas"/>
+                <a:cs typeface="Consolas"/>
+                <a:sym typeface="Consolas"/>
+              </a:rPr>
+              <a:t>Sequence Diagrams of each implementation</a:t>
+            </a:r>
+          </a:p>
+        </p:txBody>
+      </p:sp>
+      <p:sp>
+        <p:nvSpPr>
+          <p:cNvPr id="14" name="Google Shape;88;p15">
+            <a:extLst>
+              <a:ext uri="{FF2B5EF4-FFF2-40B4-BE49-F238E27FC236}">
+                <a16:creationId xmlns:a16="http://schemas.microsoft.com/office/drawing/2014/main" id="{8C64A14D-D3D9-19F9-31A0-D317F0F2A210}"/>
+              </a:ext>
+            </a:extLst>
+          </p:cNvPr>
+          <p:cNvSpPr/>
+          <p:nvPr/>
+        </p:nvSpPr>
+        <p:spPr>
+          <a:xfrm>
+            <a:off x="15532407" y="866070"/>
+            <a:ext cx="2525225" cy="837555"/>
+          </a:xfrm>
+          <a:prstGeom prst="roundRect">
+            <a:avLst>
+              <a:gd name="adj" fmla="val 16667"/>
+            </a:avLst>
+          </a:prstGeom>
+          <a:solidFill>
+            <a:srgbClr val="D9EAD3"/>
+          </a:solidFill>
+          <a:ln w="28575" cap="flat" cmpd="sng">
+            <a:solidFill>
+              <a:srgbClr val="274E13"/>
+            </a:solidFill>
+            <a:prstDash val="solid"/>
+            <a:round/>
+            <a:headEnd type="none" w="sm" len="sm"/>
+            <a:tailEnd type="none" w="sm" len="sm"/>
+          </a:ln>
+        </p:spPr>
+        <p:txBody>
+          <a:bodyPr spcFirstLastPara="1" wrap="square" lIns="91425" tIns="91425" rIns="91425" bIns="91425" anchor="t" anchorCtr="0">
+            <a:noAutofit/>
+          </a:bodyPr>
+          <a:lstStyle/>
+          <a:p>
+            <a:pPr marL="0" lvl="0" indent="0" algn="l" rtl="0">
+              <a:spcBef>
+                <a:spcPts val="0"/>
+              </a:spcBef>
+              <a:spcAft>
+                <a:spcPts val="0"/>
+              </a:spcAft>
+              <a:buNone/>
+            </a:pPr>
+            <a:r>
+              <a:rPr lang="en-US" noProof="0" dirty="0">
+                <a:latin typeface="Consolas"/>
+                <a:ea typeface="Consolas"/>
+                <a:cs typeface="Consolas"/>
+                <a:sym typeface="Consolas"/>
+              </a:rPr>
+              <a:t>Class Diagrams of each implementation</a:t>
+            </a:r>
+          </a:p>
+        </p:txBody>
+      </p:sp>
+      <p:sp>
+        <p:nvSpPr>
+          <p:cNvPr id="16" name="Google Shape;88;p15">
+            <a:extLst>
+              <a:ext uri="{FF2B5EF4-FFF2-40B4-BE49-F238E27FC236}">
+                <a16:creationId xmlns:a16="http://schemas.microsoft.com/office/drawing/2014/main" id="{3149965C-6C6C-BCAF-C496-3465C7C13F57}"/>
+              </a:ext>
+            </a:extLst>
+          </p:cNvPr>
+          <p:cNvSpPr/>
+          <p:nvPr/>
+        </p:nvSpPr>
+        <p:spPr>
+          <a:xfrm>
+            <a:off x="18654134" y="9112789"/>
+            <a:ext cx="2525225" cy="837555"/>
+          </a:xfrm>
+          <a:prstGeom prst="roundRect">
+            <a:avLst>
+              <a:gd name="adj" fmla="val 16667"/>
+            </a:avLst>
+          </a:prstGeom>
+          <a:solidFill>
+            <a:srgbClr val="D9EAD3"/>
+          </a:solidFill>
+          <a:ln w="28575" cap="flat" cmpd="sng">
+            <a:solidFill>
+              <a:srgbClr val="274E13"/>
+            </a:solidFill>
+            <a:prstDash val="solid"/>
+            <a:round/>
+            <a:headEnd type="none" w="sm" len="sm"/>
+            <a:tailEnd type="none" w="sm" len="sm"/>
+          </a:ln>
+        </p:spPr>
+        <p:txBody>
+          <a:bodyPr spcFirstLastPara="1" wrap="square" lIns="91425" tIns="91425" rIns="91425" bIns="91425" anchor="t" anchorCtr="0">
+            <a:noAutofit/>
+          </a:bodyPr>
+          <a:lstStyle/>
+          <a:p>
+            <a:pPr marL="0" lvl="0" indent="0" algn="l" rtl="0">
+              <a:spcBef>
+                <a:spcPts val="0"/>
+              </a:spcBef>
+              <a:spcAft>
+                <a:spcPts val="0"/>
+              </a:spcAft>
+              <a:buNone/>
+            </a:pPr>
+            <a:r>
+              <a:rPr lang="en-US" noProof="0" dirty="0">
+                <a:latin typeface="Consolas"/>
+                <a:ea typeface="Consolas"/>
+                <a:cs typeface="Consolas"/>
+                <a:sym typeface="Consolas"/>
+              </a:rPr>
+              <a:t>Final Version of each implementation</a:t>
+            </a:r>
+          </a:p>
+        </p:txBody>
+      </p:sp>
+      <p:sp>
+        <p:nvSpPr>
+          <p:cNvPr id="18" name="Google Shape;88;p15">
+            <a:extLst>
+              <a:ext uri="{FF2B5EF4-FFF2-40B4-BE49-F238E27FC236}">
+                <a16:creationId xmlns:a16="http://schemas.microsoft.com/office/drawing/2014/main" id="{38725758-1FC8-1274-303D-7095C0CA0AA7}"/>
+              </a:ext>
+            </a:extLst>
+          </p:cNvPr>
+          <p:cNvSpPr/>
+          <p:nvPr/>
+        </p:nvSpPr>
+        <p:spPr>
+          <a:xfrm>
+            <a:off x="12520151" y="3200903"/>
+            <a:ext cx="2525225" cy="837555"/>
+          </a:xfrm>
+          <a:prstGeom prst="roundRect">
+            <a:avLst>
+              <a:gd name="adj" fmla="val 16667"/>
+            </a:avLst>
+          </a:prstGeom>
+          <a:solidFill>
+            <a:srgbClr val="D9EAD3"/>
+          </a:solidFill>
+          <a:ln w="28575" cap="flat" cmpd="sng">
+            <a:solidFill>
+              <a:srgbClr val="274E13"/>
+            </a:solidFill>
+            <a:prstDash val="solid"/>
+            <a:round/>
+            <a:headEnd type="none" w="sm" len="sm"/>
+            <a:tailEnd type="none" w="sm" len="sm"/>
+          </a:ln>
+        </p:spPr>
+        <p:txBody>
+          <a:bodyPr spcFirstLastPara="1" wrap="square" lIns="91425" tIns="91425" rIns="91425" bIns="91425" anchor="t" anchorCtr="0">
+            <a:noAutofit/>
+          </a:bodyPr>
+          <a:lstStyle/>
+          <a:p>
+            <a:pPr marL="0" lvl="0" indent="0" algn="l" rtl="0">
+              <a:spcBef>
+                <a:spcPts val="0"/>
+              </a:spcBef>
+              <a:spcAft>
+                <a:spcPts val="0"/>
+              </a:spcAft>
+              <a:buNone/>
+            </a:pPr>
+            <a:r>
+              <a:rPr lang="en-US" noProof="0" dirty="0">
+                <a:latin typeface="Consolas"/>
+                <a:ea typeface="Consolas"/>
+                <a:cs typeface="Consolas"/>
+                <a:sym typeface="Consolas"/>
+              </a:rPr>
+              <a:t>Unit tests for each implementation </a:t>
+            </a:r>
+          </a:p>
+        </p:txBody>
+      </p:sp>
+      <p:sp>
+        <p:nvSpPr>
+          <p:cNvPr id="19" name="Google Shape;88;p15">
+            <a:extLst>
+              <a:ext uri="{FF2B5EF4-FFF2-40B4-BE49-F238E27FC236}">
+                <a16:creationId xmlns:a16="http://schemas.microsoft.com/office/drawing/2014/main" id="{4150FBA4-8AAD-8E8B-ADD5-4F6B4EBD50C4}"/>
+              </a:ext>
+            </a:extLst>
+          </p:cNvPr>
+          <p:cNvSpPr/>
+          <p:nvPr/>
+        </p:nvSpPr>
+        <p:spPr>
+          <a:xfrm>
+            <a:off x="12520151" y="4559445"/>
+            <a:ext cx="2525225" cy="837555"/>
+          </a:xfrm>
+          <a:prstGeom prst="roundRect">
+            <a:avLst>
+              <a:gd name="adj" fmla="val 16667"/>
+            </a:avLst>
+          </a:prstGeom>
+          <a:solidFill>
+            <a:srgbClr val="D9EAD3"/>
+          </a:solidFill>
+          <a:ln w="28575" cap="flat" cmpd="sng">
+            <a:solidFill>
+              <a:srgbClr val="274E13"/>
+            </a:solidFill>
+            <a:prstDash val="solid"/>
+            <a:round/>
+            <a:headEnd type="none" w="sm" len="sm"/>
+            <a:tailEnd type="none" w="sm" len="sm"/>
+          </a:ln>
+        </p:spPr>
+        <p:txBody>
+          <a:bodyPr spcFirstLastPara="1" wrap="square" lIns="91425" tIns="91425" rIns="91425" bIns="91425" anchor="t" anchorCtr="0">
+            <a:noAutofit/>
+          </a:bodyPr>
+          <a:lstStyle/>
+          <a:p>
+            <a:pPr marL="0" lvl="0" indent="0" algn="l" rtl="0">
+              <a:spcBef>
+                <a:spcPts val="0"/>
+              </a:spcBef>
+              <a:spcAft>
+                <a:spcPts val="0"/>
+              </a:spcAft>
+              <a:buNone/>
+            </a:pPr>
+            <a:r>
+              <a:rPr lang="en-US" dirty="0">
+                <a:latin typeface="Consolas"/>
+                <a:ea typeface="Consolas"/>
+                <a:cs typeface="Consolas"/>
+                <a:sym typeface="Consolas"/>
+              </a:rPr>
+              <a:t>Demo video of the new features in the game</a:t>
+            </a:r>
+            <a:endParaRPr lang="en-US" noProof="0" dirty="0">
+              <a:latin typeface="Consolas"/>
+              <a:ea typeface="Consolas"/>
+              <a:cs typeface="Consolas"/>
+              <a:sym typeface="Consolas"/>
+            </a:endParaRPr>
+          </a:p>
+        </p:txBody>
+      </p:sp>
+      <p:sp>
+        <p:nvSpPr>
+          <p:cNvPr id="20" name="Google Shape;88;p15">
+            <a:extLst>
+              <a:ext uri="{FF2B5EF4-FFF2-40B4-BE49-F238E27FC236}">
+                <a16:creationId xmlns:a16="http://schemas.microsoft.com/office/drawing/2014/main" id="{1D47F1BF-753A-C070-B4A5-F02CCA8C6FA5}"/>
+              </a:ext>
+            </a:extLst>
+          </p:cNvPr>
+          <p:cNvSpPr/>
+          <p:nvPr/>
+        </p:nvSpPr>
+        <p:spPr>
+          <a:xfrm>
+            <a:off x="9366071" y="6027217"/>
+            <a:ext cx="2525225" cy="837555"/>
+          </a:xfrm>
+          <a:prstGeom prst="roundRect">
+            <a:avLst>
+              <a:gd name="adj" fmla="val 16667"/>
+            </a:avLst>
+          </a:prstGeom>
+          <a:solidFill>
+            <a:srgbClr val="D9EAD3"/>
+          </a:solidFill>
+          <a:ln w="28575" cap="flat" cmpd="sng">
+            <a:solidFill>
+              <a:srgbClr val="274E13"/>
+            </a:solidFill>
+            <a:prstDash val="solid"/>
+            <a:round/>
+            <a:headEnd type="none" w="sm" len="sm"/>
+            <a:tailEnd type="none" w="sm" len="sm"/>
+          </a:ln>
+        </p:spPr>
+        <p:txBody>
+          <a:bodyPr spcFirstLastPara="1" wrap="square" lIns="91425" tIns="91425" rIns="91425" bIns="91425" anchor="t" anchorCtr="0">
+            <a:noAutofit/>
+          </a:bodyPr>
+          <a:lstStyle/>
+          <a:p>
+            <a:pPr marL="0" lvl="0" indent="0" algn="l" rtl="0">
+              <a:spcBef>
+                <a:spcPts val="0"/>
+              </a:spcBef>
+              <a:spcAft>
+                <a:spcPts val="0"/>
+              </a:spcAft>
+              <a:buNone/>
+            </a:pPr>
+            <a:r>
+              <a:rPr lang="en-US" noProof="0" dirty="0">
+                <a:latin typeface="Consolas"/>
+                <a:ea typeface="Consolas"/>
+                <a:cs typeface="Consolas"/>
+                <a:sym typeface="Consolas"/>
+              </a:rPr>
+              <a:t>Video of the progress of the scrum board</a:t>
+            </a:r>
+          </a:p>
+        </p:txBody>
+      </p:sp>
+    </p:spTree>
+    <p:extLst>
+      <p:ext uri="{BB962C8B-B14F-4D97-AF65-F5344CB8AC3E}">
+        <p14:creationId xmlns:p14="http://schemas.microsoft.com/office/powerpoint/2010/main" val="3525400009"/>
       </p:ext>
     </p:extLst>
   </p:cSld>

</xml_diff>